<commit_message>
add module graphics updates
</commit_message>
<xml_diff>
--- a/docs/graphics/graphics.pptx
+++ b/docs/graphics/graphics.pptx
@@ -14388,16 +14388,25 @@
             <a:prstGeom prst="line">
               <a:avLst/>
             </a:prstGeom>
+            <a:ln>
+              <a:solidFill>
+                <a:schemeClr val="tx1">
+                  <a:lumMod val="50000"/>
+                  <a:lumOff val="50000"/>
+                </a:schemeClr>
+              </a:solidFill>
+              <a:prstDash val="sysDot"/>
+            </a:ln>
           </p:spPr>
           <p:style>
             <a:lnRef idx="2">
-              <a:schemeClr val="accent1"/>
+              <a:schemeClr val="dk1"/>
             </a:lnRef>
             <a:fillRef idx="0">
-              <a:schemeClr val="accent1"/>
+              <a:schemeClr val="dk1"/>
             </a:fillRef>
             <a:effectRef idx="1">
-              <a:schemeClr val="accent1"/>
+              <a:schemeClr val="dk1"/>
             </a:effectRef>
             <a:fontRef idx="minor">
               <a:schemeClr val="tx1"/>
@@ -14512,8 +14521,8 @@
             </a:p>
           </p:txBody>
         </p:sp>
-        <mc:AlternateContent xmlns:mc="http://schemas.openxmlformats.org/markup-compatibility/2006">
-          <mc:Choice xmlns:a14="http://schemas.microsoft.com/office/drawing/2010/main" Requires="a14">
+        <mc:AlternateContent xmlns:mc="http://schemas.openxmlformats.org/markup-compatibility/2006" xmlns:a14="http://schemas.microsoft.com/office/drawing/2010/main">
+          <mc:Choice Requires="a14">
             <p:sp>
               <p:nvSpPr>
                 <p:cNvPr id="45" name="TextBox 44">
@@ -14582,7 +14591,7 @@
               </p:txBody>
             </p:sp>
           </mc:Choice>
-          <mc:Fallback>
+          <mc:Fallback xmlns="">
             <p:sp>
               <p:nvSpPr>
                 <p:cNvPr id="45" name="TextBox 44">
@@ -14627,8 +14636,8 @@
             </p:sp>
           </mc:Fallback>
         </mc:AlternateContent>
-        <mc:AlternateContent xmlns:mc="http://schemas.openxmlformats.org/markup-compatibility/2006">
-          <mc:Choice xmlns:a14="http://schemas.microsoft.com/office/drawing/2010/main" Requires="a14">
+        <mc:AlternateContent xmlns:mc="http://schemas.openxmlformats.org/markup-compatibility/2006" xmlns:a14="http://schemas.microsoft.com/office/drawing/2010/main">
+          <mc:Choice Requires="a14">
             <p:sp>
               <p:nvSpPr>
                 <p:cNvPr id="46" name="TextBox 45">
@@ -14697,7 +14706,7 @@
               </p:txBody>
             </p:sp>
           </mc:Choice>
-          <mc:Fallback>
+          <mc:Fallback xmlns="">
             <p:sp>
               <p:nvSpPr>
                 <p:cNvPr id="46" name="TextBox 45">
@@ -14742,8 +14751,8 @@
             </p:sp>
           </mc:Fallback>
         </mc:AlternateContent>
-        <mc:AlternateContent xmlns:mc="http://schemas.openxmlformats.org/markup-compatibility/2006">
-          <mc:Choice xmlns:a14="http://schemas.microsoft.com/office/drawing/2010/main" Requires="a14">
+        <mc:AlternateContent xmlns:mc="http://schemas.openxmlformats.org/markup-compatibility/2006" xmlns:a14="http://schemas.microsoft.com/office/drawing/2010/main">
+          <mc:Choice Requires="a14">
             <p:sp>
               <p:nvSpPr>
                 <p:cNvPr id="47" name="TextBox 46">
@@ -14818,7 +14827,7 @@
               </p:txBody>
             </p:sp>
           </mc:Choice>
-          <mc:Fallback>
+          <mc:Fallback xmlns="">
             <p:sp>
               <p:nvSpPr>
                 <p:cNvPr id="47" name="TextBox 46">
@@ -14863,8 +14872,8 @@
             </p:sp>
           </mc:Fallback>
         </mc:AlternateContent>
-        <mc:AlternateContent xmlns:mc="http://schemas.openxmlformats.org/markup-compatibility/2006">
-          <mc:Choice xmlns:a14="http://schemas.microsoft.com/office/drawing/2010/main" Requires="a14">
+        <mc:AlternateContent xmlns:mc="http://schemas.openxmlformats.org/markup-compatibility/2006" xmlns:a14="http://schemas.microsoft.com/office/drawing/2010/main">
+          <mc:Choice Requires="a14">
             <p:sp>
               <p:nvSpPr>
                 <p:cNvPr id="48" name="TextBox 47">
@@ -14933,7 +14942,7 @@
               </p:txBody>
             </p:sp>
           </mc:Choice>
-          <mc:Fallback>
+          <mc:Fallback xmlns="">
             <p:sp>
               <p:nvSpPr>
                 <p:cNvPr id="48" name="TextBox 47">
@@ -14978,8 +14987,8 @@
             </p:sp>
           </mc:Fallback>
         </mc:AlternateContent>
-        <mc:AlternateContent xmlns:mc="http://schemas.openxmlformats.org/markup-compatibility/2006">
-          <mc:Choice xmlns:a14="http://schemas.microsoft.com/office/drawing/2010/main" Requires="a14">
+        <mc:AlternateContent xmlns:mc="http://schemas.openxmlformats.org/markup-compatibility/2006" xmlns:a14="http://schemas.microsoft.com/office/drawing/2010/main">
+          <mc:Choice Requires="a14">
             <p:sp>
               <p:nvSpPr>
                 <p:cNvPr id="49" name="TextBox 48">
@@ -15048,7 +15057,7 @@
               </p:txBody>
             </p:sp>
           </mc:Choice>
-          <mc:Fallback>
+          <mc:Fallback xmlns="">
             <p:sp>
               <p:nvSpPr>
                 <p:cNvPr id="49" name="TextBox 48">
@@ -15093,8 +15102,8 @@
             </p:sp>
           </mc:Fallback>
         </mc:AlternateContent>
-        <mc:AlternateContent xmlns:mc="http://schemas.openxmlformats.org/markup-compatibility/2006">
-          <mc:Choice xmlns:a14="http://schemas.microsoft.com/office/drawing/2010/main" Requires="a14">
+        <mc:AlternateContent xmlns:mc="http://schemas.openxmlformats.org/markup-compatibility/2006" xmlns:a14="http://schemas.microsoft.com/office/drawing/2010/main">
+          <mc:Choice Requires="a14">
             <p:sp>
               <p:nvSpPr>
                 <p:cNvPr id="50" name="TextBox 49">
@@ -15169,7 +15178,7 @@
               </p:txBody>
             </p:sp>
           </mc:Choice>
-          <mc:Fallback>
+          <mc:Fallback xmlns="">
             <p:sp>
               <p:nvSpPr>
                 <p:cNvPr id="50" name="TextBox 49">
@@ -15214,8 +15223,8 @@
             </p:sp>
           </mc:Fallback>
         </mc:AlternateContent>
-        <mc:AlternateContent xmlns:mc="http://schemas.openxmlformats.org/markup-compatibility/2006">
-          <mc:Choice xmlns:a14="http://schemas.microsoft.com/office/drawing/2010/main" Requires="a14">
+        <mc:AlternateContent xmlns:mc="http://schemas.openxmlformats.org/markup-compatibility/2006" xmlns:a14="http://schemas.microsoft.com/office/drawing/2010/main">
+          <mc:Choice Requires="a14">
             <p:sp>
               <p:nvSpPr>
                 <p:cNvPr id="51" name="TextBox 50">
@@ -15276,7 +15285,7 @@
               </p:txBody>
             </p:sp>
           </mc:Choice>
-          <mc:Fallback>
+          <mc:Fallback xmlns="">
             <p:sp>
               <p:nvSpPr>
                 <p:cNvPr id="51" name="TextBox 50">
@@ -15321,8 +15330,8 @@
             </p:sp>
           </mc:Fallback>
         </mc:AlternateContent>
-        <mc:AlternateContent xmlns:mc="http://schemas.openxmlformats.org/markup-compatibility/2006">
-          <mc:Choice xmlns:a14="http://schemas.microsoft.com/office/drawing/2010/main" Requires="a14">
+        <mc:AlternateContent xmlns:mc="http://schemas.openxmlformats.org/markup-compatibility/2006" xmlns:a14="http://schemas.microsoft.com/office/drawing/2010/main">
+          <mc:Choice Requires="a14">
             <p:sp>
               <p:nvSpPr>
                 <p:cNvPr id="52" name="TextBox 51">
@@ -15388,7 +15397,7 @@
               </p:txBody>
             </p:sp>
           </mc:Choice>
-          <mc:Fallback>
+          <mc:Fallback xmlns="">
             <p:sp>
               <p:nvSpPr>
                 <p:cNvPr id="52" name="TextBox 51">
@@ -15433,8 +15442,8 @@
             </p:sp>
           </mc:Fallback>
         </mc:AlternateContent>
-        <mc:AlternateContent xmlns:mc="http://schemas.openxmlformats.org/markup-compatibility/2006">
-          <mc:Choice xmlns:a14="http://schemas.microsoft.com/office/drawing/2010/main" Requires="a14">
+        <mc:AlternateContent xmlns:mc="http://schemas.openxmlformats.org/markup-compatibility/2006" xmlns:a14="http://schemas.microsoft.com/office/drawing/2010/main">
+          <mc:Choice Requires="a14">
             <p:sp>
               <p:nvSpPr>
                 <p:cNvPr id="53" name="TextBox 52">
@@ -15485,7 +15494,7 @@
               </p:txBody>
             </p:sp>
           </mc:Choice>
-          <mc:Fallback>
+          <mc:Fallback xmlns="">
             <p:sp>
               <p:nvSpPr>
                 <p:cNvPr id="53" name="TextBox 52">
@@ -15530,8 +15539,8 @@
             </p:sp>
           </mc:Fallback>
         </mc:AlternateContent>
-        <mc:AlternateContent xmlns:mc="http://schemas.openxmlformats.org/markup-compatibility/2006">
-          <mc:Choice xmlns:a14="http://schemas.microsoft.com/office/drawing/2010/main" Requires="a14">
+        <mc:AlternateContent xmlns:mc="http://schemas.openxmlformats.org/markup-compatibility/2006" xmlns:a14="http://schemas.microsoft.com/office/drawing/2010/main">
+          <mc:Choice Requires="a14">
             <p:sp>
               <p:nvSpPr>
                 <p:cNvPr id="54" name="TextBox 53">
@@ -15637,7 +15646,7 @@
               </p:txBody>
             </p:sp>
           </mc:Choice>
-          <mc:Fallback>
+          <mc:Fallback xmlns="">
             <p:sp>
               <p:nvSpPr>
                 <p:cNvPr id="54" name="TextBox 53">
@@ -15682,8 +15691,8 @@
             </p:sp>
           </mc:Fallback>
         </mc:AlternateContent>
-        <mc:AlternateContent xmlns:mc="http://schemas.openxmlformats.org/markup-compatibility/2006">
-          <mc:Choice xmlns:a14="http://schemas.microsoft.com/office/drawing/2010/main" Requires="a14">
+        <mc:AlternateContent xmlns:mc="http://schemas.openxmlformats.org/markup-compatibility/2006" xmlns:a14="http://schemas.microsoft.com/office/drawing/2010/main">
+          <mc:Choice Requires="a14">
             <p:sp>
               <p:nvSpPr>
                 <p:cNvPr id="55" name="TextBox 54">
@@ -15764,7 +15773,7 @@
               </p:txBody>
             </p:sp>
           </mc:Choice>
-          <mc:Fallback>
+          <mc:Fallback xmlns="">
             <p:sp>
               <p:nvSpPr>
                 <p:cNvPr id="55" name="TextBox 54">
@@ -15809,8 +15818,8 @@
             </p:sp>
           </mc:Fallback>
         </mc:AlternateContent>
-        <mc:AlternateContent xmlns:mc="http://schemas.openxmlformats.org/markup-compatibility/2006">
-          <mc:Choice xmlns:a14="http://schemas.microsoft.com/office/drawing/2010/main" Requires="a14">
+        <mc:AlternateContent xmlns:mc="http://schemas.openxmlformats.org/markup-compatibility/2006" xmlns:a14="http://schemas.microsoft.com/office/drawing/2010/main">
+          <mc:Choice Requires="a14">
             <p:sp>
               <p:nvSpPr>
                 <p:cNvPr id="56" name="TextBox 55">
@@ -15871,7 +15880,7 @@
               </p:txBody>
             </p:sp>
           </mc:Choice>
-          <mc:Fallback>
+          <mc:Fallback xmlns="">
             <p:sp>
               <p:nvSpPr>
                 <p:cNvPr id="56" name="TextBox 55">
@@ -15916,8 +15925,8 @@
             </p:sp>
           </mc:Fallback>
         </mc:AlternateContent>
-        <mc:AlternateContent xmlns:mc="http://schemas.openxmlformats.org/markup-compatibility/2006">
-          <mc:Choice xmlns:a14="http://schemas.microsoft.com/office/drawing/2010/main" Requires="a14">
+        <mc:AlternateContent xmlns:mc="http://schemas.openxmlformats.org/markup-compatibility/2006" xmlns:a14="http://schemas.microsoft.com/office/drawing/2010/main">
+          <mc:Choice Requires="a14">
             <p:sp>
               <p:nvSpPr>
                 <p:cNvPr id="57" name="TextBox 56">
@@ -16002,7 +16011,7 @@
               </p:txBody>
             </p:sp>
           </mc:Choice>
-          <mc:Fallback>
+          <mc:Fallback xmlns="">
             <p:sp>
               <p:nvSpPr>
                 <p:cNvPr id="57" name="TextBox 56">
@@ -16047,8 +16056,8 @@
             </p:sp>
           </mc:Fallback>
         </mc:AlternateContent>
-        <mc:AlternateContent xmlns:mc="http://schemas.openxmlformats.org/markup-compatibility/2006">
-          <mc:Choice xmlns:a14="http://schemas.microsoft.com/office/drawing/2010/main" Requires="a14">
+        <mc:AlternateContent xmlns:mc="http://schemas.openxmlformats.org/markup-compatibility/2006" xmlns:a14="http://schemas.microsoft.com/office/drawing/2010/main">
+          <mc:Choice Requires="a14">
             <p:sp>
               <p:nvSpPr>
                 <p:cNvPr id="58" name="TextBox 57">
@@ -16099,7 +16108,7 @@
               </p:txBody>
             </p:sp>
           </mc:Choice>
-          <mc:Fallback>
+          <mc:Fallback xmlns="">
             <p:sp>
               <p:nvSpPr>
                 <p:cNvPr id="58" name="TextBox 57">
@@ -16144,8 +16153,8 @@
             </p:sp>
           </mc:Fallback>
         </mc:AlternateContent>
-        <mc:AlternateContent xmlns:mc="http://schemas.openxmlformats.org/markup-compatibility/2006">
-          <mc:Choice xmlns:a14="http://schemas.microsoft.com/office/drawing/2010/main" Requires="a14">
+        <mc:AlternateContent xmlns:mc="http://schemas.openxmlformats.org/markup-compatibility/2006" xmlns:a14="http://schemas.microsoft.com/office/drawing/2010/main">
+          <mc:Choice Requires="a14">
             <p:sp>
               <p:nvSpPr>
                 <p:cNvPr id="59" name="TextBox 58">
@@ -16226,7 +16235,7 @@
               </p:txBody>
             </p:sp>
           </mc:Choice>
-          <mc:Fallback>
+          <mc:Fallback xmlns="">
             <p:sp>
               <p:nvSpPr>
                 <p:cNvPr id="59" name="TextBox 58">
@@ -16271,8 +16280,8 @@
             </p:sp>
           </mc:Fallback>
         </mc:AlternateContent>
-        <mc:AlternateContent xmlns:mc="http://schemas.openxmlformats.org/markup-compatibility/2006">
-          <mc:Choice xmlns:a14="http://schemas.microsoft.com/office/drawing/2010/main" Requires="a14">
+        <mc:AlternateContent xmlns:mc="http://schemas.openxmlformats.org/markup-compatibility/2006" xmlns:a14="http://schemas.microsoft.com/office/drawing/2010/main">
+          <mc:Choice Requires="a14">
             <p:sp>
               <p:nvSpPr>
                 <p:cNvPr id="60" name="TextBox 59">
@@ -16378,7 +16387,7 @@
               </p:txBody>
             </p:sp>
           </mc:Choice>
-          <mc:Fallback>
+          <mc:Fallback xmlns="">
             <p:sp>
               <p:nvSpPr>
                 <p:cNvPr id="60" name="TextBox 59">
@@ -16633,8 +16642,8 @@
             </a:p>
           </p:txBody>
         </p:sp>
-        <mc:AlternateContent xmlns:mc="http://schemas.openxmlformats.org/markup-compatibility/2006">
-          <mc:Choice xmlns:a14="http://schemas.microsoft.com/office/drawing/2010/main" Requires="a14">
+        <mc:AlternateContent xmlns:mc="http://schemas.openxmlformats.org/markup-compatibility/2006" xmlns:a14="http://schemas.microsoft.com/office/drawing/2010/main">
+          <mc:Choice Requires="a14">
             <p:sp>
               <p:nvSpPr>
                 <p:cNvPr id="3" name="TextBox 2">
@@ -16719,7 +16728,7 @@
               </p:txBody>
             </p:sp>
           </mc:Choice>
-          <mc:Fallback>
+          <mc:Fallback xmlns="">
             <p:sp>
               <p:nvSpPr>
                 <p:cNvPr id="3" name="TextBox 2">

</xml_diff>